<commit_message>
Atualiza apresentação com a versão mais recente
</commit_message>
<xml_diff>
--- a/docs/Apresentacao_Webphp_LucianoBampaVieira.pptx
+++ b/docs/Apresentacao_Webphp_LucianoBampaVieira.pptx
@@ -2036,7 +2036,7 @@
 <dgm:dataModel xmlns:dgm="http://schemas.openxmlformats.org/drawingml/2006/diagram" xmlns:a="http://schemas.openxmlformats.org/drawingml/2006/main">
   <dgm:ptLst>
     <dgm:pt modelId="{F4FB475C-4733-406A-B2F8-358AF400B878}" type="doc">
-      <dgm:prSet loTypeId="urn:microsoft.com/office/officeart/2005/8/layout/default" loCatId="list" qsTypeId="urn:microsoft.com/office/officeart/2005/8/quickstyle/simple4" qsCatId="simple" csTypeId="urn:microsoft.com/office/officeart/2005/8/colors/colorful5" csCatId="colorful"/>
+      <dgm:prSet loTypeId="urn:microsoft.com/office/officeart/2005/8/layout/default" loCatId="list" qsTypeId="urn:microsoft.com/office/officeart/2005/8/quickstyle/simple4" qsCatId="simple" csTypeId="urn:microsoft.com/office/officeart/2005/8/colors/colorful5" csCatId="colorful" phldr="1"/>
       <dgm:spPr/>
       <dgm:t>
         <a:bodyPr/>
@@ -2047,16 +2047,21 @@
       </dgm:t>
     </dgm:pt>
     <dgm:pt modelId="{58499CF3-7717-4E28-87DA-417B193D8315}">
-      <dgm:prSet/>
+      <dgm:prSet custT="1"/>
       <dgm:spPr/>
       <dgm:t>
         <a:bodyPr/>
         <a:lstStyle/>
         <a:p>
           <a:r>
-            <a:rPr lang="en-US"/>
-            <a:t>GitHub: https://github.com/LucianoBampa</a:t>
+            <a:rPr lang="en-US" sz="2400" dirty="0"/>
+            <a:t>GitHub: </a:t>
           </a:r>
+          <a:r>
+            <a:rPr lang="pt-BR" sz="1600" dirty="0"/>
+            <a:t>https://github.com/LucianoBampa/gerenciador-tarefas</a:t>
+          </a:r>
+          <a:endParaRPr lang="en-US" sz="1600" dirty="0"/>
         </a:p>
       </dgm:t>
     </dgm:pt>
@@ -2091,8 +2096,9 @@
         <a:p>
           <a:r>
             <a:rPr lang="en-US"/>
-            <a:t>Obrigado ao professor e aos colegas!</a:t>
+            <a:t>Obrigado!</a:t>
           </a:r>
+          <a:endParaRPr lang="en-US" dirty="0"/>
         </a:p>
       </dgm:t>
     </dgm:pt>
@@ -2128,7 +2134,7 @@
       <dgm:spPr/>
     </dgm:pt>
     <dgm:pt modelId="{DC2F1B1E-7E08-46F4-938E-A3A183935A6F}" type="pres">
-      <dgm:prSet presAssocID="{58499CF3-7717-4E28-87DA-417B193D8315}" presName="node" presStyleLbl="node1" presStyleIdx="0" presStyleCnt="2">
+      <dgm:prSet presAssocID="{58499CF3-7717-4E28-87DA-417B193D8315}" presName="node" presStyleLbl="node1" presStyleIdx="0" presStyleCnt="2" custScaleX="119208" custLinFactNeighborX="-1208" custLinFactNeighborY="-23">
         <dgm:presLayoutVars>
           <dgm:bulletEnabled val="1"/>
         </dgm:presLayoutVars>
@@ -2140,7 +2146,7 @@
       <dgm:spPr/>
     </dgm:pt>
     <dgm:pt modelId="{0A5BBD5F-E1C9-4CFD-B793-173C360206A5}" type="pres">
-      <dgm:prSet presAssocID="{3FDA72D0-F81A-4A8C-B34A-900D01D9B0B5}" presName="node" presStyleLbl="node1" presStyleIdx="1" presStyleCnt="2">
+      <dgm:prSet presAssocID="{3FDA72D0-F81A-4A8C-B34A-900D01D9B0B5}" presName="node" presStyleLbl="node1" presStyleIdx="1" presStyleCnt="2" custScaleX="119208">
         <dgm:presLayoutVars>
           <dgm:bulletEnabled val="1"/>
         </dgm:presLayoutVars>
@@ -2745,8 +2751,8 @@
       </dsp:nvSpPr>
       <dsp:spPr>
         <a:xfrm>
-          <a:off x="402842" y="574"/>
-          <a:ext cx="4194439" cy="2516663"/>
+          <a:off x="0" y="0"/>
+          <a:ext cx="5000107" cy="2516663"/>
         </a:xfrm>
         <a:prstGeom prst="rect">
           <a:avLst/>
@@ -2809,12 +2815,12 @@
         </a:fontRef>
       </dsp:style>
       <dsp:txBody>
-        <a:bodyPr spcFirstLastPara="0" vert="horz" wrap="square" lIns="80010" tIns="80010" rIns="80010" bIns="80010" numCol="1" spcCol="1270" anchor="ctr" anchorCtr="0">
+        <a:bodyPr spcFirstLastPara="0" vert="horz" wrap="square" lIns="91440" tIns="91440" rIns="91440" bIns="91440" numCol="1" spcCol="1270" anchor="ctr" anchorCtr="0">
           <a:noAutofit/>
         </a:bodyPr>
         <a:lstStyle/>
         <a:p>
-          <a:pPr marL="0" lvl="0" indent="0" algn="ctr" defTabSz="933450">
+          <a:pPr marL="0" lvl="0" indent="0" algn="ctr" defTabSz="1066800">
             <a:lnSpc>
               <a:spcPct val="90000"/>
             </a:lnSpc>
@@ -2827,14 +2833,19 @@
             <a:buNone/>
           </a:pPr>
           <a:r>
-            <a:rPr lang="en-US" sz="2100" kern="1200"/>
-            <a:t>GitHub: https://github.com/LucianoBampa</a:t>
+            <a:rPr lang="en-US" sz="2400" kern="1200" dirty="0"/>
+            <a:t>GitHub: </a:t>
           </a:r>
+          <a:r>
+            <a:rPr lang="pt-BR" sz="1600" kern="1200" dirty="0"/>
+            <a:t>https://github.com/LucianoBampa/gerenciador-tarefas</a:t>
+          </a:r>
+          <a:endParaRPr lang="en-US" sz="1600" kern="1200" dirty="0"/>
         </a:p>
       </dsp:txBody>
       <dsp:txXfrm>
-        <a:off x="402842" y="574"/>
-        <a:ext cx="4194439" cy="2516663"/>
+        <a:off x="0" y="0"/>
+        <a:ext cx="5000107" cy="2516663"/>
       </dsp:txXfrm>
     </dsp:sp>
     <dsp:sp modelId="{0A5BBD5F-E1C9-4CFD-B793-173C360206A5}">
@@ -2844,8 +2855,8 @@
       </dsp:nvSpPr>
       <dsp:spPr>
         <a:xfrm>
-          <a:off x="402842" y="2936681"/>
-          <a:ext cx="4194439" cy="2516663"/>
+          <a:off x="8" y="2936681"/>
+          <a:ext cx="5000107" cy="2516663"/>
         </a:xfrm>
         <a:prstGeom prst="rect">
           <a:avLst/>
@@ -2908,12 +2919,12 @@
         </a:fontRef>
       </dsp:style>
       <dsp:txBody>
-        <a:bodyPr spcFirstLastPara="0" vert="horz" wrap="square" lIns="80010" tIns="80010" rIns="80010" bIns="80010" numCol="1" spcCol="1270" anchor="ctr" anchorCtr="0">
+        <a:bodyPr spcFirstLastPara="0" vert="horz" wrap="square" lIns="247650" tIns="247650" rIns="247650" bIns="247650" numCol="1" spcCol="1270" anchor="ctr" anchorCtr="0">
           <a:noAutofit/>
         </a:bodyPr>
         <a:lstStyle/>
         <a:p>
-          <a:pPr marL="0" lvl="0" indent="0" algn="ctr" defTabSz="933450">
+          <a:pPr marL="0" lvl="0" indent="0" algn="ctr" defTabSz="2889250">
             <a:lnSpc>
               <a:spcPct val="90000"/>
             </a:lnSpc>
@@ -2926,14 +2937,15 @@
             <a:buNone/>
           </a:pPr>
           <a:r>
-            <a:rPr lang="en-US" sz="2100" kern="1200"/>
-            <a:t>Obrigado ao professor e aos colegas!</a:t>
+            <a:rPr lang="en-US" sz="6500" kern="1200"/>
+            <a:t>Obrigado!</a:t>
           </a:r>
+          <a:endParaRPr lang="en-US" sz="6500" kern="1200" dirty="0"/>
         </a:p>
       </dsp:txBody>
       <dsp:txXfrm>
-        <a:off x="402842" y="2936681"/>
-        <a:ext cx="4194439" cy="2516663"/>
+        <a:off x="8" y="2936681"/>
+        <a:ext cx="5000107" cy="2516663"/>
       </dsp:txXfrm>
     </dsp:sp>
   </dsp:spTree>
@@ -10164,7 +10176,7 @@
             <p:ph idx="1"/>
             <p:extLst>
               <p:ext uri="{D42A27DB-BD31-4B8C-83A1-F6EECF244321}">
-                <p14:modId xmlns:p14="http://schemas.microsoft.com/office/powerpoint/2010/main" val="2001271989"/>
+                <p14:modId xmlns:p14="http://schemas.microsoft.com/office/powerpoint/2010/main" val="414143840"/>
               </p:ext>
             </p:extLst>
           </p:nvPr>

</xml_diff>